<commit_message>
- add empty presentation
</commit_message>
<xml_diff>
--- a/presentations/2-Highlights.pptx
+++ b/presentations/2-Highlights.pptx
@@ -204,7 +204,7 @@
           <a:p>
             <a:fld id="{2115E3A2-82E5-42DC-84E0-683A4FF0E075}" type="datetimeFigureOut">
               <a:rPr lang="nl-NL" smtClean="0"/>
-              <a:t>5-11-2025</a:t>
+              <a:t>6-11-2025</a:t>
             </a:fld>
             <a:endParaRPr lang="nl-NL"/>
           </a:p>
@@ -763,7 +763,7 @@
           <a:p>
             <a:fld id="{2BE7F1A7-46C0-614C-8973-2677197B1A3C}" type="datetimeFigureOut">
               <a:rPr lang="en-US" smtClean="0"/>
-              <a:t>11/5/2025</a:t>
+              <a:t>11/6/2025</a:t>
             </a:fld>
             <a:endParaRPr lang="en-US"/>
           </a:p>
@@ -961,7 +961,7 @@
           <a:p>
             <a:fld id="{2BE7F1A7-46C0-614C-8973-2677197B1A3C}" type="datetimeFigureOut">
               <a:rPr lang="en-US" smtClean="0"/>
-              <a:t>11/5/2025</a:t>
+              <a:t>11/6/2025</a:t>
             </a:fld>
             <a:endParaRPr lang="en-US"/>
           </a:p>
@@ -1169,7 +1169,7 @@
           <a:p>
             <a:fld id="{2BE7F1A7-46C0-614C-8973-2677197B1A3C}" type="datetimeFigureOut">
               <a:rPr lang="en-US" smtClean="0"/>
-              <a:t>11/5/2025</a:t>
+              <a:t>11/6/2025</a:t>
             </a:fld>
             <a:endParaRPr lang="en-US"/>
           </a:p>
@@ -1367,7 +1367,7 @@
           <a:p>
             <a:fld id="{2BE7F1A7-46C0-614C-8973-2677197B1A3C}" type="datetimeFigureOut">
               <a:rPr lang="en-US" smtClean="0"/>
-              <a:t>11/5/2025</a:t>
+              <a:t>11/6/2025</a:t>
             </a:fld>
             <a:endParaRPr lang="en-US"/>
           </a:p>
@@ -1642,7 +1642,7 @@
           <a:p>
             <a:fld id="{2BE7F1A7-46C0-614C-8973-2677197B1A3C}" type="datetimeFigureOut">
               <a:rPr lang="en-US" smtClean="0"/>
-              <a:t>11/5/2025</a:t>
+              <a:t>11/6/2025</a:t>
             </a:fld>
             <a:endParaRPr lang="en-US"/>
           </a:p>
@@ -1907,7 +1907,7 @@
           <a:p>
             <a:fld id="{2BE7F1A7-46C0-614C-8973-2677197B1A3C}" type="datetimeFigureOut">
               <a:rPr lang="en-US" smtClean="0"/>
-              <a:t>11/5/2025</a:t>
+              <a:t>11/6/2025</a:t>
             </a:fld>
             <a:endParaRPr lang="en-US"/>
           </a:p>
@@ -2319,7 +2319,7 @@
           <a:p>
             <a:fld id="{2BE7F1A7-46C0-614C-8973-2677197B1A3C}" type="datetimeFigureOut">
               <a:rPr lang="en-US" smtClean="0"/>
-              <a:t>11/5/2025</a:t>
+              <a:t>11/6/2025</a:t>
             </a:fld>
             <a:endParaRPr lang="en-US"/>
           </a:p>
@@ -2460,7 +2460,7 @@
           <a:p>
             <a:fld id="{2BE7F1A7-46C0-614C-8973-2677197B1A3C}" type="datetimeFigureOut">
               <a:rPr lang="en-US" smtClean="0"/>
-              <a:t>11/5/2025</a:t>
+              <a:t>11/6/2025</a:t>
             </a:fld>
             <a:endParaRPr lang="en-US"/>
           </a:p>
@@ -2573,7 +2573,7 @@
           <a:p>
             <a:fld id="{2BE7F1A7-46C0-614C-8973-2677197B1A3C}" type="datetimeFigureOut">
               <a:rPr lang="en-US" smtClean="0"/>
-              <a:t>11/5/2025</a:t>
+              <a:t>11/6/2025</a:t>
             </a:fld>
             <a:endParaRPr lang="en-US"/>
           </a:p>
@@ -2884,7 +2884,7 @@
           <a:p>
             <a:fld id="{2BE7F1A7-46C0-614C-8973-2677197B1A3C}" type="datetimeFigureOut">
               <a:rPr lang="en-US" smtClean="0"/>
-              <a:t>11/5/2025</a:t>
+              <a:t>11/6/2025</a:t>
             </a:fld>
             <a:endParaRPr lang="en-US"/>
           </a:p>
@@ -3172,7 +3172,7 @@
           <a:p>
             <a:fld id="{2BE7F1A7-46C0-614C-8973-2677197B1A3C}" type="datetimeFigureOut">
               <a:rPr lang="en-US" smtClean="0"/>
-              <a:t>11/5/2025</a:t>
+              <a:t>11/6/2025</a:t>
             </a:fld>
             <a:endParaRPr lang="en-US"/>
           </a:p>
@@ -3413,7 +3413,7 @@
           <a:p>
             <a:fld id="{2BE7F1A7-46C0-614C-8973-2677197B1A3C}" type="datetimeFigureOut">
               <a:rPr lang="en-US" smtClean="0"/>
-              <a:t>11/5/2025</a:t>
+              <a:t>11/6/2025</a:t>
             </a:fld>
             <a:endParaRPr lang="en-US"/>
           </a:p>
@@ -4495,7 +4495,7 @@
                   <a:srgbClr val="FFFFFF"/>
                 </a:solidFill>
               </a:rPr>
-              <a:t>Numerical Solution</a:t>
+              <a:t>Highlights</a:t>
             </a:r>
             <a:br>
               <a:rPr lang="en-GB" sz="4400" dirty="0">
@@ -4510,7 +4510,7 @@
                   <a:srgbClr val="D27961"/>
                 </a:solidFill>
               </a:rPr>
-              <a:t>Configuration &amp; Diagnostics</a:t>
+              <a:t>New features and development plans</a:t>
             </a:r>
             <a:endParaRPr lang="en-US" sz="4400" i="1" dirty="0">
               <a:solidFill>
@@ -4588,7 +4588,7 @@
           <a:noFill/>
           <a:extLst>
             <a:ext uri="{909E8E84-426E-40dd-AFC4-6F175D3DCCD1}">
-              <a14:hiddenFill xmlns:a14="http://schemas.microsoft.com/office/drawing/2010/main" xmlns="">
+              <a14:hiddenFill xmlns="" xmlns:a14="http://schemas.microsoft.com/office/drawing/2010/main">
                 <a:solidFill>
                   <a:srgbClr val="FFFFFF"/>
                 </a:solidFill>

</xml_diff>